<commit_message>
Reviewed PPT based on presentation notes
</commit_message>
<xml_diff>
--- a/Deliverable2/Deliverable2_PPT_CourseGenie+.pptx
+++ b/Deliverable2/Deliverable2_PPT_CourseGenie+.pptx
@@ -40,7 +40,7 @@
       <p:boldItalic r:id="rId23"/>
     </p:embeddedFont>
     <p:embeddedFont>
-      <p:font typeface="Ubuntu Condensed" panose="020F0502020204030204" pitchFamily="34" charset="0"/>
+      <p:font typeface="Ubuntu Condensed" panose="020B0506030602030204" pitchFamily="34" charset="0"/>
       <p:regular r:id="rId24"/>
     </p:embeddedFont>
   </p:embeddedFontLst>
@@ -9576,7 +9576,7 @@
                 </a:solidFill>
                 <a:latin typeface="Ubuntu" panose="020B0504030602030204" pitchFamily="34" charset="0"/>
               </a:rPr>
-              <a:t>Work divided into sprints (1 month each) with clear milestones.</a:t>
+              <a:t>Work divided into sprints (approx. 1 month each) with clear milestones.</a:t>
             </a:r>
           </a:p>
           <a:p>
@@ -9748,14 +9748,14 @@
           <p:nvPr>
             <p:extLst>
               <p:ext uri="{D42A27DB-BD31-4B8C-83A1-F6EECF244321}">
-                <p14:modId xmlns:p14="http://schemas.microsoft.com/office/powerpoint/2010/main" val="3244134620"/>
+                <p14:modId xmlns:p14="http://schemas.microsoft.com/office/powerpoint/2010/main" val="1440038321"/>
               </p:ext>
             </p:extLst>
           </p:nvPr>
         </p:nvGraphicFramePr>
         <p:xfrm>
           <a:off x="719962" y="1313534"/>
-          <a:ext cx="7797873" cy="3079561"/>
+          <a:ext cx="8040580" cy="3058130"/>
         </p:xfrm>
         <a:graphic>
           <a:graphicData uri="http://schemas.openxmlformats.org/drawingml/2006/table">
@@ -9765,14 +9765,14 @@
                 <a:tableStyleId>{6C814C40-6234-4B4D-BC92-BC2D0D53636F}</a:tableStyleId>
               </a:tblPr>
               <a:tblGrid>
-                <a:gridCol w="2261777">
+                <a:gridCol w="2332174">
                   <a:extLst>
                     <a:ext uri="{9D8B030D-6E8A-4147-A177-3AD203B41FA5}">
                       <a16:colId xmlns:a16="http://schemas.microsoft.com/office/drawing/2014/main" val="20000"/>
                     </a:ext>
                   </a:extLst>
                 </a:gridCol>
-                <a:gridCol w="5536096">
+                <a:gridCol w="5708406">
                   <a:extLst>
                     <a:ext uri="{9D8B030D-6E8A-4147-A177-3AD203B41FA5}">
                       <a16:colId xmlns:a16="http://schemas.microsoft.com/office/drawing/2014/main" val="20001"/>
@@ -9787,6 +9787,9 @@
                     <a:lstStyle/>
                     <a:p>
                       <a:pPr marL="0" lvl="0" indent="0" algn="l" rtl="0">
+                        <a:lnSpc>
+                          <a:spcPct val="100000"/>
+                        </a:lnSpc>
                         <a:spcBef>
                           <a:spcPts val="0"/>
                         </a:spcBef>
@@ -9796,7 +9799,7 @@
                         <a:buNone/>
                       </a:pPr>
                       <a:r>
-                        <a:rPr lang="en" sz="1800" b="1" dirty="0">
+                        <a:rPr lang="en" sz="1200" b="1" dirty="0">
                           <a:solidFill>
                             <a:schemeClr val="dk1"/>
                           </a:solidFill>
@@ -9807,7 +9810,7 @@
                         </a:rPr>
                         <a:t>Stakeholder</a:t>
                       </a:r>
-                      <a:endParaRPr sz="1800" b="1" dirty="0">
+                      <a:endParaRPr sz="1200" b="1" dirty="0">
                         <a:solidFill>
                           <a:schemeClr val="dk1"/>
                         </a:solidFill>
@@ -9866,6 +9869,9 @@
                     <a:lstStyle/>
                     <a:p>
                       <a:pPr marL="0" lvl="0" indent="0" algn="l" rtl="0">
+                        <a:lnSpc>
+                          <a:spcPct val="100000"/>
+                        </a:lnSpc>
                         <a:spcBef>
                           <a:spcPts val="0"/>
                         </a:spcBef>
@@ -9875,7 +9881,7 @@
                         <a:buNone/>
                       </a:pPr>
                       <a:r>
-                        <a:rPr lang="en" sz="1800" b="1" dirty="0">
+                        <a:rPr lang="en" sz="1200" b="1" dirty="0">
                           <a:solidFill>
                             <a:schemeClr val="dk1"/>
                           </a:solidFill>
@@ -9886,9 +9892,98 @@
                         </a:rPr>
                         <a:t>Interest</a:t>
                       </a:r>
-                      <a:endParaRPr sz="1800" b="1" dirty="0">
+                      <a:endParaRPr sz="1200" b="1" dirty="0">
                         <a:solidFill>
                           <a:schemeClr val="dk1"/>
+                        </a:solidFill>
+                        <a:latin typeface="Ubuntu" panose="020B0504030602030204" pitchFamily="34" charset="0"/>
+                        <a:ea typeface="Ubuntu Condensed"/>
+                        <a:cs typeface="Ubuntu Condensed"/>
+                        <a:sym typeface="Ubuntu Condensed"/>
+                      </a:endParaRPr>
+                    </a:p>
+                  </a:txBody>
+                  <a:tcPr marL="91425" marR="91425" marT="68575" marB="68575" anchor="ctr">
+                    <a:lnL w="19050" cap="flat" cmpd="sng" algn="ctr">
+                      <a:solidFill>
+                        <a:schemeClr val="dk1"/>
+                      </a:solidFill>
+                      <a:prstDash val="solid"/>
+                      <a:round/>
+                      <a:headEnd type="none" w="sm" len="sm"/>
+                      <a:tailEnd type="none" w="sm" len="sm"/>
+                    </a:lnL>
+                    <a:lnR w="19050" cap="flat" cmpd="sng">
+                      <a:solidFill>
+                        <a:schemeClr val="dk1"/>
+                      </a:solidFill>
+                      <a:prstDash val="solid"/>
+                      <a:round/>
+                      <a:headEnd type="none" w="sm" len="sm"/>
+                      <a:tailEnd type="none" w="sm" len="sm"/>
+                    </a:lnR>
+                    <a:lnT w="19050" cap="flat" cmpd="sng">
+                      <a:solidFill>
+                        <a:schemeClr val="dk1"/>
+                      </a:solidFill>
+                      <a:prstDash val="solid"/>
+                      <a:round/>
+                      <a:headEnd type="none" w="sm" len="sm"/>
+                      <a:tailEnd type="none" w="sm" len="sm"/>
+                    </a:lnT>
+                    <a:lnB w="19050" cap="flat" cmpd="sng" algn="ctr">
+                      <a:solidFill>
+                        <a:schemeClr val="dk1"/>
+                      </a:solidFill>
+                      <a:prstDash val="solid"/>
+                      <a:round/>
+                      <a:headEnd type="none" w="sm" len="sm"/>
+                      <a:tailEnd type="none" w="sm" len="sm"/>
+                    </a:lnB>
+                    <a:solidFill>
+                      <a:schemeClr val="lt1"/>
+                    </a:solidFill>
+                  </a:tcPr>
+                </a:tc>
+                <a:extLst>
+                  <a:ext uri="{0D108BD9-81ED-4DB2-BD59-A6C34878D82A}">
+                    <a16:rowId xmlns:a16="http://schemas.microsoft.com/office/drawing/2014/main" val="10000"/>
+                  </a:ext>
+                </a:extLst>
+              </a:tr>
+              <a:tr h="359717">
+                <a:tc gridSpan="2">
+                  <a:txBody>
+                    <a:bodyPr/>
+                    <a:lstStyle/>
+                    <a:p>
+                      <a:pPr marL="0" lvl="0" indent="0" algn="l" rtl="0">
+                        <a:lnSpc>
+                          <a:spcPct val="100000"/>
+                        </a:lnSpc>
+                        <a:spcBef>
+                          <a:spcPts val="0"/>
+                        </a:spcBef>
+                        <a:spcAft>
+                          <a:spcPts val="0"/>
+                        </a:spcAft>
+                        <a:buNone/>
+                      </a:pPr>
+                      <a:r>
+                        <a:rPr lang="en-US" sz="1200" b="1" dirty="0">
+                          <a:solidFill>
+                            <a:schemeClr val="tx2"/>
+                          </a:solidFill>
+                          <a:latin typeface="Ubuntu" panose="020B0504030602030204" pitchFamily="34" charset="0"/>
+                          <a:ea typeface="Ubuntu Condensed"/>
+                          <a:cs typeface="Ubuntu Condensed"/>
+                          <a:sym typeface="Ubuntu Condensed"/>
+                        </a:rPr>
+                        <a:t>Primary Stakeholders</a:t>
+                      </a:r>
+                      <a:endParaRPr sz="1200" b="1" dirty="0">
+                        <a:solidFill>
+                          <a:schemeClr val="tx2"/>
                         </a:solidFill>
                         <a:latin typeface="Ubuntu" panose="020B0504030602030204" pitchFamily="34" charset="0"/>
                         <a:ea typeface="Ubuntu Condensed"/>
@@ -9916,7 +10011,7 @@
                       <a:headEnd type="none" w="sm" len="sm"/>
                       <a:tailEnd type="none" w="sm" len="sm"/>
                     </a:lnR>
-                    <a:lnT w="19050" cap="flat" cmpd="sng">
+                    <a:lnT w="19050" cap="flat" cmpd="sng" algn="ctr">
                       <a:solidFill>
                         <a:schemeClr val="dk1"/>
                       </a:solidFill>
@@ -9939,13 +10034,80 @@
                     </a:solidFill>
                   </a:tcPr>
                 </a:tc>
+                <a:tc hMerge="1">
+                  <a:txBody>
+                    <a:bodyPr/>
+                    <a:lstStyle/>
+                    <a:p>
+                      <a:pPr marL="0" lvl="0" indent="0" algn="l" rtl="0">
+                        <a:spcBef>
+                          <a:spcPts val="0"/>
+                        </a:spcBef>
+                        <a:spcAft>
+                          <a:spcPts val="0"/>
+                        </a:spcAft>
+                        <a:buNone/>
+                      </a:pPr>
+                      <a:endParaRPr sz="1800" b="1" dirty="0">
+                        <a:solidFill>
+                          <a:schemeClr val="dk1"/>
+                        </a:solidFill>
+                        <a:latin typeface="Ubuntu" panose="020B0504030602030204" pitchFamily="34" charset="0"/>
+                        <a:ea typeface="Ubuntu Condensed"/>
+                        <a:cs typeface="Ubuntu Condensed"/>
+                        <a:sym typeface="Ubuntu Condensed"/>
+                      </a:endParaRPr>
+                    </a:p>
+                  </a:txBody>
+                  <a:tcPr marL="91425" marR="91425" marT="68575" marB="68575" anchor="ctr">
+                    <a:lnL w="19050" cap="flat" cmpd="sng" algn="ctr">
+                      <a:solidFill>
+                        <a:schemeClr val="dk1"/>
+                      </a:solidFill>
+                      <a:prstDash val="solid"/>
+                      <a:round/>
+                      <a:headEnd type="none" w="sm" len="sm"/>
+                      <a:tailEnd type="none" w="sm" len="sm"/>
+                    </a:lnL>
+                    <a:lnR w="19050" cap="flat" cmpd="sng">
+                      <a:solidFill>
+                        <a:schemeClr val="dk1"/>
+                      </a:solidFill>
+                      <a:prstDash val="solid"/>
+                      <a:round/>
+                      <a:headEnd type="none" w="sm" len="sm"/>
+                      <a:tailEnd type="none" w="sm" len="sm"/>
+                    </a:lnR>
+                    <a:lnT w="19050" cap="flat" cmpd="sng" algn="ctr">
+                      <a:solidFill>
+                        <a:schemeClr val="dk1"/>
+                      </a:solidFill>
+                      <a:prstDash val="solid"/>
+                      <a:round/>
+                      <a:headEnd type="none" w="sm" len="sm"/>
+                      <a:tailEnd type="none" w="sm" len="sm"/>
+                    </a:lnT>
+                    <a:lnB w="19050" cap="flat" cmpd="sng" algn="ctr">
+                      <a:solidFill>
+                        <a:schemeClr val="dk1"/>
+                      </a:solidFill>
+                      <a:prstDash val="solid"/>
+                      <a:round/>
+                      <a:headEnd type="none" w="sm" len="sm"/>
+                      <a:tailEnd type="none" w="sm" len="sm"/>
+                    </a:lnB>
+                    <a:solidFill>
+                      <a:schemeClr val="lt1"/>
+                    </a:solidFill>
+                  </a:tcPr>
+                </a:tc>
                 <a:extLst>
                   <a:ext uri="{0D108BD9-81ED-4DB2-BD59-A6C34878D82A}">
-                    <a16:rowId xmlns:a16="http://schemas.microsoft.com/office/drawing/2014/main" val="10000"/>
+                    <a16:rowId xmlns:a16="http://schemas.microsoft.com/office/drawing/2014/main" val="36426713"/>
                   </a:ext>
                 </a:extLst>
               </a:tr>
-              <a:tr h="814696">
+              <a:tr h="580103">
                 <a:tc>
                   <a:txBody>
                     <a:bodyPr/>
@@ -9953,7 +10115,7 @@
                     <a:p>
                       <a:pPr marL="0" marR="0" lvl="0" indent="0" algn="l" rtl="0">
                         <a:lnSpc>
-                          <a:spcPct val="200000"/>
+                          <a:spcPct val="100000"/>
                         </a:lnSpc>
                         <a:spcBef>
                           <a:spcPts val="0"/>
@@ -9968,7 +10130,7 @@
                         <a:buNone/>
                       </a:pPr>
                       <a:r>
-                        <a:rPr lang="en-US" sz="1400" b="1" i="0" u="none" strike="noStrike" cap="none" dirty="0">
+                        <a:rPr lang="en-US" sz="1200" b="1" i="0" u="none" strike="noStrike" cap="none" dirty="0">
                           <a:solidFill>
                             <a:srgbClr val="D69535"/>
                           </a:solidFill>
@@ -9978,7 +10140,7 @@
                         </a:rPr>
                         <a:t>Professors</a:t>
                       </a:r>
-                      <a:endParaRPr sz="1400" b="1" i="0" u="none" strike="noStrike" cap="none" dirty="0">
+                      <a:endParaRPr sz="1200" b="1" i="0" u="none" strike="noStrike" cap="none" dirty="0">
                         <a:solidFill>
                           <a:srgbClr val="D69535"/>
                         </a:solidFill>
@@ -10038,7 +10200,7 @@
                     <a:p>
                       <a:pPr marL="139700" marR="0" lvl="0" indent="0" algn="l" rtl="0">
                         <a:lnSpc>
-                          <a:spcPct val="200000"/>
+                          <a:spcPct val="100000"/>
                         </a:lnSpc>
                         <a:spcBef>
                           <a:spcPts val="0"/>
@@ -10067,7 +10229,7 @@
                     </a:p>
                   </a:txBody>
                   <a:tcPr marL="0" marR="0" marT="0" marB="0" anchor="ctr">
-                    <a:lnL w="19050" cap="flat" cmpd="sng">
+                    <a:lnL w="19050" cap="flat" cmpd="sng" algn="ctr">
                       <a:solidFill>
                         <a:schemeClr val="dk1"/>
                       </a:solidFill>
@@ -10085,7 +10247,7 @@
                       <a:headEnd type="none" w="sm" len="sm"/>
                       <a:tailEnd type="none" w="sm" len="sm"/>
                     </a:lnR>
-                    <a:lnT w="19050" cap="flat" cmpd="sng">
+                    <a:lnT w="19050" cap="flat" cmpd="sng" algn="ctr">
                       <a:solidFill>
                         <a:schemeClr val="dk1"/>
                       </a:solidFill>
@@ -10094,7 +10256,7 @@
                       <a:headEnd type="none" w="sm" len="sm"/>
                       <a:tailEnd type="none" w="sm" len="sm"/>
                     </a:lnT>
-                    <a:lnB w="19050" cap="flat" cmpd="sng">
+                    <a:lnB w="19050" cap="flat" cmpd="sng" algn="ctr">
                       <a:solidFill>
                         <a:schemeClr val="dk1"/>
                       </a:solidFill>
@@ -10114,7 +10276,7 @@
                   </a:ext>
                 </a:extLst>
               </a:tr>
-              <a:tr h="814696">
+              <a:tr h="602077">
                 <a:tc>
                   <a:txBody>
                     <a:bodyPr/>
@@ -10122,7 +10284,7 @@
                     <a:p>
                       <a:pPr marL="0" lvl="0" indent="0" algn="l" rtl="0">
                         <a:lnSpc>
-                          <a:spcPct val="200000"/>
+                          <a:spcPct val="100000"/>
                         </a:lnSpc>
                         <a:spcBef>
                           <a:spcPts val="0"/>
@@ -10133,7 +10295,7 @@
                         <a:buNone/>
                       </a:pPr>
                       <a:r>
-                        <a:rPr lang="en" b="1" dirty="0">
+                        <a:rPr lang="en" sz="1200" b="1" dirty="0">
                           <a:solidFill>
                             <a:srgbClr val="D69535"/>
                           </a:solidFill>
@@ -10144,7 +10306,7 @@
                         </a:rPr>
                         <a:t>Administrators</a:t>
                       </a:r>
-                      <a:endParaRPr b="1" dirty="0">
+                      <a:endParaRPr sz="1200" b="1" dirty="0">
                         <a:solidFill>
                           <a:srgbClr val="D69535"/>
                         </a:solidFill>
@@ -10204,7 +10366,7 @@
                     <a:p>
                       <a:pPr marL="139700" marR="0" lvl="0" indent="0" algn="l" rtl="0">
                         <a:lnSpc>
-                          <a:spcPct val="200000"/>
+                          <a:spcPct val="100000"/>
                         </a:lnSpc>
                         <a:spcBef>
                           <a:spcPts val="0"/>
@@ -10242,6 +10404,93 @@
                     </a:p>
                   </a:txBody>
                   <a:tcPr marL="0" marR="0" marT="0" marB="0" anchor="ctr">
+                    <a:lnL w="19050" cap="flat" cmpd="sng" algn="ctr">
+                      <a:solidFill>
+                        <a:schemeClr val="dk1"/>
+                      </a:solidFill>
+                      <a:prstDash val="solid"/>
+                      <a:round/>
+                      <a:headEnd type="none" w="sm" len="sm"/>
+                      <a:tailEnd type="none" w="sm" len="sm"/>
+                    </a:lnL>
+                    <a:lnR w="19050" cap="flat" cmpd="sng">
+                      <a:solidFill>
+                        <a:schemeClr val="dk1"/>
+                      </a:solidFill>
+                      <a:prstDash val="solid"/>
+                      <a:round/>
+                      <a:headEnd type="none" w="sm" len="sm"/>
+                      <a:tailEnd type="none" w="sm" len="sm"/>
+                    </a:lnR>
+                    <a:lnT w="19050" cap="flat" cmpd="sng" algn="ctr">
+                      <a:solidFill>
+                        <a:schemeClr val="dk1"/>
+                      </a:solidFill>
+                      <a:prstDash val="solid"/>
+                      <a:round/>
+                      <a:headEnd type="none" w="sm" len="sm"/>
+                      <a:tailEnd type="none" w="sm" len="sm"/>
+                    </a:lnT>
+                    <a:lnB w="19050" cap="flat" cmpd="sng" algn="ctr">
+                      <a:solidFill>
+                        <a:schemeClr val="dk1"/>
+                      </a:solidFill>
+                      <a:prstDash val="solid"/>
+                      <a:round/>
+                      <a:headEnd type="none" w="sm" len="sm"/>
+                      <a:tailEnd type="none" w="sm" len="sm"/>
+                    </a:lnB>
+                    <a:solidFill>
+                      <a:schemeClr val="lt1"/>
+                    </a:solidFill>
+                  </a:tcPr>
+                </a:tc>
+                <a:extLst>
+                  <a:ext uri="{0D108BD9-81ED-4DB2-BD59-A6C34878D82A}">
+                    <a16:rowId xmlns:a16="http://schemas.microsoft.com/office/drawing/2014/main" val="10002"/>
+                  </a:ext>
+                </a:extLst>
+              </a:tr>
+              <a:tr h="371317">
+                <a:tc gridSpan="2">
+                  <a:txBody>
+                    <a:bodyPr/>
+                    <a:lstStyle/>
+                    <a:p>
+                      <a:pPr marL="0" marR="0" lvl="0" indent="0" algn="l" defTabSz="914400" rtl="0" eaLnBrk="1" fontAlgn="auto" latinLnBrk="0" hangingPunct="1">
+                        <a:lnSpc>
+                          <a:spcPct val="100000"/>
+                        </a:lnSpc>
+                        <a:spcBef>
+                          <a:spcPts val="0"/>
+                        </a:spcBef>
+                        <a:spcAft>
+                          <a:spcPts val="0"/>
+                        </a:spcAft>
+                        <a:buClr>
+                          <a:srgbClr val="000000"/>
+                        </a:buClr>
+                        <a:buSzTx/>
+                        <a:buFont typeface="Arial"/>
+                        <a:buNone/>
+                        <a:tabLst/>
+                        <a:defRPr/>
+                      </a:pPr>
+                      <a:r>
+                        <a:rPr lang="en-US" sz="1200" b="1" i="0" u="none" strike="noStrike" cap="none" dirty="0">
+                          <a:solidFill>
+                            <a:schemeClr val="tx2"/>
+                          </a:solidFill>
+                          <a:latin typeface="Ubuntu" panose="020B0504030602030204" pitchFamily="34" charset="0"/>
+                          <a:ea typeface="Ubuntu Condensed"/>
+                          <a:cs typeface="Ubuntu Condensed"/>
+                          <a:sym typeface="Ubuntu Condensed"/>
+                        </a:rPr>
+                        <a:t>Primary Stakeholders</a:t>
+                      </a:r>
+                    </a:p>
+                  </a:txBody>
+                  <a:tcPr marL="91425" marR="91425" marT="0" marB="0" anchor="ctr">
                     <a:lnL w="19050" cap="flat" cmpd="sng">
                       <a:solidFill>
                         <a:schemeClr val="dk1"/>
@@ -10260,7 +10509,7 @@
                       <a:headEnd type="none" w="sm" len="sm"/>
                       <a:tailEnd type="none" w="sm" len="sm"/>
                     </a:lnR>
-                    <a:lnT w="19050" cap="flat" cmpd="sng">
+                    <a:lnT w="19050" cap="flat" cmpd="sng" algn="ctr">
                       <a:solidFill>
                         <a:schemeClr val="dk1"/>
                       </a:solidFill>
@@ -10283,13 +10532,88 @@
                     </a:solidFill>
                   </a:tcPr>
                 </a:tc>
+                <a:tc hMerge="1">
+                  <a:txBody>
+                    <a:bodyPr/>
+                    <a:lstStyle/>
+                    <a:p>
+                      <a:pPr marL="139700" marR="0" lvl="0" indent="0" algn="l" rtl="0">
+                        <a:lnSpc>
+                          <a:spcPct val="200000"/>
+                        </a:lnSpc>
+                        <a:spcBef>
+                          <a:spcPts val="0"/>
+                        </a:spcBef>
+                        <a:spcAft>
+                          <a:spcPts val="0"/>
+                        </a:spcAft>
+                        <a:buClr>
+                          <a:schemeClr val="dk1"/>
+                        </a:buClr>
+                        <a:buSzPts val="1400"/>
+                        <a:buFont typeface="Arial" panose="020B0604020202020204" pitchFamily="34" charset="0"/>
+                        <a:buNone/>
+                      </a:pPr>
+                      <a:endParaRPr sz="1200" b="0" i="0" u="none" strike="noStrike" cap="none" dirty="0">
+                        <a:solidFill>
+                          <a:srgbClr val="000000"/>
+                        </a:solidFill>
+                        <a:latin typeface="Ubuntu" panose="020B0504030602030204" pitchFamily="34" charset="0"/>
+                        <a:ea typeface="Cairo"/>
+                        <a:cs typeface="Arial"/>
+                        <a:sym typeface="Cairo"/>
+                      </a:endParaRPr>
+                    </a:p>
+                  </a:txBody>
+                  <a:tcPr marL="0" marR="0" marT="0" marB="0" anchor="ctr">
+                    <a:lnL w="19050" cap="flat" cmpd="sng" algn="ctr">
+                      <a:solidFill>
+                        <a:schemeClr val="dk1"/>
+                      </a:solidFill>
+                      <a:prstDash val="solid"/>
+                      <a:round/>
+                      <a:headEnd type="none" w="sm" len="sm"/>
+                      <a:tailEnd type="none" w="sm" len="sm"/>
+                    </a:lnL>
+                    <a:lnR w="19050" cap="flat" cmpd="sng">
+                      <a:solidFill>
+                        <a:schemeClr val="dk1"/>
+                      </a:solidFill>
+                      <a:prstDash val="solid"/>
+                      <a:round/>
+                      <a:headEnd type="none" w="sm" len="sm"/>
+                      <a:tailEnd type="none" w="sm" len="sm"/>
+                    </a:lnR>
+                    <a:lnT w="19050" cap="flat" cmpd="sng" algn="ctr">
+                      <a:solidFill>
+                        <a:schemeClr val="dk1"/>
+                      </a:solidFill>
+                      <a:prstDash val="solid"/>
+                      <a:round/>
+                      <a:headEnd type="none" w="sm" len="sm"/>
+                      <a:tailEnd type="none" w="sm" len="sm"/>
+                    </a:lnT>
+                    <a:lnB w="19050" cap="flat" cmpd="sng" algn="ctr">
+                      <a:solidFill>
+                        <a:schemeClr val="dk1"/>
+                      </a:solidFill>
+                      <a:prstDash val="solid"/>
+                      <a:round/>
+                      <a:headEnd type="none" w="sm" len="sm"/>
+                      <a:tailEnd type="none" w="sm" len="sm"/>
+                    </a:lnB>
+                    <a:solidFill>
+                      <a:schemeClr val="lt1"/>
+                    </a:solidFill>
+                  </a:tcPr>
+                </a:tc>
                 <a:extLst>
                   <a:ext uri="{0D108BD9-81ED-4DB2-BD59-A6C34878D82A}">
-                    <a16:rowId xmlns:a16="http://schemas.microsoft.com/office/drawing/2014/main" val="10002"/>
+                    <a16:rowId xmlns:a16="http://schemas.microsoft.com/office/drawing/2014/main" val="651444014"/>
                   </a:ext>
                 </a:extLst>
               </a:tr>
-              <a:tr h="950491">
+              <a:tr h="645238">
                 <a:tc>
                   <a:txBody>
                     <a:bodyPr/>
@@ -10297,7 +10621,7 @@
                     <a:p>
                       <a:pPr marL="0" marR="0" lvl="0" indent="0" algn="l" defTabSz="914400" rtl="0" eaLnBrk="1" fontAlgn="auto" latinLnBrk="0" hangingPunct="1">
                         <a:lnSpc>
-                          <a:spcPct val="200000"/>
+                          <a:spcPct val="100000"/>
                         </a:lnSpc>
                         <a:spcBef>
                           <a:spcPts val="0"/>
@@ -10315,7 +10639,7 @@
                         <a:defRPr/>
                       </a:pPr>
                       <a:r>
-                        <a:rPr lang="en-AE" sz="1400" b="1" i="0" u="none" strike="noStrike" cap="none" dirty="0">
+                        <a:rPr lang="en-AE" sz="1200" b="1" i="0" u="none" strike="noStrike" cap="none" dirty="0">
                           <a:solidFill>
                             <a:srgbClr val="D69535"/>
                           </a:solidFill>
@@ -10376,7 +10700,7 @@
                     <a:p>
                       <a:pPr marL="139700" marR="0" lvl="0" indent="0" algn="l" rtl="0">
                         <a:lnSpc>
-                          <a:spcPct val="200000"/>
+                          <a:spcPct val="100000"/>
                         </a:lnSpc>
                         <a:spcBef>
                           <a:spcPts val="0"/>
@@ -10405,7 +10729,7 @@
                     </a:p>
                   </a:txBody>
                   <a:tcPr marL="0" marR="0" marT="0" marB="0" anchor="ctr">
-                    <a:lnL w="19050" cap="flat" cmpd="sng">
+                    <a:lnL w="19050" cap="flat" cmpd="sng" algn="ctr">
                       <a:solidFill>
                         <a:schemeClr val="dk1"/>
                       </a:solidFill>
@@ -10423,7 +10747,7 @@
                       <a:headEnd type="none" w="sm" len="sm"/>
                       <a:tailEnd type="none" w="sm" len="sm"/>
                     </a:lnR>
-                    <a:lnT w="19050" cap="flat" cmpd="sng">
+                    <a:lnT w="19050" cap="flat" cmpd="sng" algn="ctr">
                       <a:solidFill>
                         <a:schemeClr val="dk1"/>
                       </a:solidFill>
@@ -14085,7 +14409,7 @@
                 </a:solidFill>
                 <a:latin typeface="Ubuntu" panose="020B0504030602030204" pitchFamily="34" charset="0"/>
               </a:rPr>
-              <a:t>Literature shows gaps in reporting, accreditation and usability.</a:t>
+              <a:t>Literature shows gaps in reporting, usability, and managing instructor tasks</a:t>
             </a:r>
           </a:p>
           <a:p>
@@ -14236,7 +14560,7 @@
         </p:nvSpPr>
         <p:spPr>
           <a:xfrm>
-            <a:off x="720000" y="1237075"/>
+            <a:off x="720000" y="1374727"/>
             <a:ext cx="7704000" cy="3366300"/>
           </a:xfrm>
         </p:spPr>
@@ -14251,21 +14575,95 @@
               <a:buNone/>
             </a:pPr>
             <a:r>
-              <a:rPr lang="en-US" sz="1400" dirty="0">
+              <a:rPr lang="en-US" dirty="0">
+                <a:solidFill>
+                  <a:schemeClr val="tx1"/>
+                </a:solidFill>
                 <a:latin typeface="Ubuntu" panose="020B0504030602030204" pitchFamily="34" charset="0"/>
               </a:rPr>
-              <a:t>	</a:t>
+              <a:t>Faculty and administrators spend significant time on repetitive academic tasks such as:</a:t>
             </a:r>
+          </a:p>
+          <a:p>
+            <a:pPr lvl="1">
+              <a:lnSpc>
+                <a:spcPct val="200000"/>
+              </a:lnSpc>
+              <a:buClr>
+                <a:schemeClr val="dk1"/>
+              </a:buClr>
+              <a:buFont typeface="Courier New" panose="02070309020205020404" pitchFamily="49" charset="0"/>
+              <a:buChar char="o"/>
+            </a:pPr>
             <a:r>
-              <a:rPr lang="en-US" sz="1400" dirty="0">
+              <a:rPr lang="en-US" sz="1200" dirty="0">
                 <a:solidFill>
                   <a:schemeClr val="tx1"/>
                 </a:solidFill>
                 <a:latin typeface="Ubuntu" panose="020B0504030602030204" pitchFamily="34" charset="0"/>
               </a:rPr>
-              <a:t>Faculty and administrators spend significant time on repetitive academic tasks such as preparing syllabi, compiling Course Assessment Reports (CAR), generating grading statistics, and preparing course peer-review reports.  Because these tasks are done manually, they reduce valuable time for teaching and research. CourseGenie+ streamlines these processes through automation and centralized dashboards, improving efficiency across the academic workflow.</a:t>
+              <a:t>Preparing Course Assessment Reports (CAR)</a:t>
             </a:r>
-            <a:endParaRPr lang="en-AE" sz="1400" dirty="0">
+          </a:p>
+          <a:p>
+            <a:pPr lvl="1">
+              <a:lnSpc>
+                <a:spcPct val="200000"/>
+              </a:lnSpc>
+              <a:buClr>
+                <a:schemeClr val="dk1"/>
+              </a:buClr>
+              <a:buFont typeface="Courier New" panose="02070309020205020404" pitchFamily="49" charset="0"/>
+              <a:buChar char="o"/>
+            </a:pPr>
+            <a:r>
+              <a:rPr lang="en-US" sz="1200" dirty="0">
+                <a:solidFill>
+                  <a:schemeClr val="tx1"/>
+                </a:solidFill>
+                <a:latin typeface="Ubuntu" panose="020B0504030602030204" pitchFamily="34" charset="0"/>
+              </a:rPr>
+              <a:t>Extracting and analyzing student grade statistics</a:t>
+            </a:r>
+          </a:p>
+          <a:p>
+            <a:pPr lvl="1">
+              <a:lnSpc>
+                <a:spcPct val="200000"/>
+              </a:lnSpc>
+              <a:buClr>
+                <a:schemeClr val="dk1"/>
+              </a:buClr>
+              <a:buFont typeface="Courier New" panose="02070309020205020404" pitchFamily="49" charset="0"/>
+              <a:buChar char="o"/>
+            </a:pPr>
+            <a:r>
+              <a:rPr lang="en-US" sz="1200" dirty="0">
+                <a:solidFill>
+                  <a:schemeClr val="tx1"/>
+                </a:solidFill>
+                <a:latin typeface="Ubuntu" panose="020B0504030602030204" pitchFamily="34" charset="0"/>
+              </a:rPr>
+              <a:t>Preparing course peer-review reports.  </a:t>
+            </a:r>
+          </a:p>
+          <a:p>
+            <a:pPr marL="139700" indent="0">
+              <a:lnSpc>
+                <a:spcPct val="200000"/>
+              </a:lnSpc>
+              <a:buNone/>
+            </a:pPr>
+            <a:r>
+              <a:rPr lang="en-US" dirty="0">
+                <a:solidFill>
+                  <a:schemeClr val="tx1"/>
+                </a:solidFill>
+                <a:latin typeface="Ubuntu" panose="020B0504030602030204" pitchFamily="34" charset="0"/>
+              </a:rPr>
+              <a:t>Because these tasks are done manually, they reduce valuable time for teaching and research. CourseGenie+ streamlines these processes through automation and centralized dashboards, improving efficiency across the academic workflow.</a:t>
+            </a:r>
+            <a:endParaRPr lang="en-AE" dirty="0">
               <a:solidFill>
                 <a:schemeClr val="tx1"/>
               </a:solidFill>
@@ -14728,6 +15126,27 @@
             </a:pPr>
             <a:r>
               <a:rPr lang="en-US" sz="1400" dirty="0">
+                <a:solidFill>
+                  <a:schemeClr val="tx1"/>
+                </a:solidFill>
+                <a:latin typeface="Ubuntu" panose="020B0504030602030204" pitchFamily="34" charset="0"/>
+              </a:rPr>
+              <a:t>Current LMS (MyCourses) lack automation and reporting features</a:t>
+            </a:r>
+            <a:endParaRPr lang="en-US" sz="1400" dirty="0">
+              <a:latin typeface="Ubuntu" panose="020B0504030602030204" pitchFamily="34" charset="0"/>
+            </a:endParaRPr>
+          </a:p>
+          <a:p>
+            <a:pPr marL="425450" indent="-285750">
+              <a:lnSpc>
+                <a:spcPct val="200000"/>
+              </a:lnSpc>
+              <a:buFont typeface="Arial" panose="020B0604020202020204" pitchFamily="34" charset="0"/>
+              <a:buChar char="•"/>
+            </a:pPr>
+            <a:r>
+              <a:rPr lang="en-US" sz="1400" dirty="0">
                 <a:latin typeface="Ubuntu" panose="020B0504030602030204" pitchFamily="34" charset="0"/>
               </a:rPr>
               <a:t>Faculty and admins face repetitive, manual tasks (syllabus, CARs, rubrics, CLO-PLO mapping, exam logistics)</a:t>
@@ -14748,7 +15167,7 @@
                 </a:solidFill>
                 <a:latin typeface="Ubuntu" panose="020B0504030602030204" pitchFamily="34" charset="0"/>
               </a:rPr>
-              <a:t>Current methods rely on emails, spreadsheets and fragmented tools.</a:t>
+              <a:t>Current methods rely on emails, spreadsheets and other external tools.</a:t>
             </a:r>
           </a:p>
           <a:p>
@@ -14766,25 +15185,7 @@
                 </a:solidFill>
                 <a:latin typeface="Ubuntu" panose="020B0504030602030204" pitchFamily="34" charset="0"/>
               </a:rPr>
-              <a:t>Current LMS (MyCourses)  lack automation and reporting features</a:t>
-            </a:r>
-          </a:p>
-          <a:p>
-            <a:pPr marL="425450" indent="-285750">
-              <a:lnSpc>
-                <a:spcPct val="200000"/>
-              </a:lnSpc>
-              <a:buFont typeface="Arial" panose="020B0604020202020204" pitchFamily="34" charset="0"/>
-              <a:buChar char="•"/>
-            </a:pPr>
-            <a:r>
-              <a:rPr lang="en-US" sz="1400" dirty="0">
-                <a:solidFill>
-                  <a:schemeClr val="tx1"/>
-                </a:solidFill>
-                <a:latin typeface="Ubuntu" panose="020B0504030602030204" pitchFamily="34" charset="0"/>
-              </a:rPr>
-              <a:t>Result: delays, inefficiencies, and accreditation difficulties.</a:t>
+              <a:t>Result: delays, inefficiencies, and reporting difficulties.</a:t>
             </a:r>
           </a:p>
           <a:p>

</xml_diff>